<commit_message>
Presentation update from Manish data
</commit_message>
<xml_diff>
--- a/proposal/project.pptx
+++ b/proposal/project.pptx
@@ -868,7 +868,7 @@
               <a:pPr>
                 <a:defRPr/>
               </a:pPr>
-              <a:t>11/30/2020</a:t>
+              <a:t>12/1/2020</a:t>
             </a:fld>
             <a:endParaRPr lang="en-US" altLang="en-US"/>
           </a:p>
@@ -1070,7 +1070,7 @@
               <a:pPr>
                 <a:defRPr/>
               </a:pPr>
-              <a:t>11/30/2020</a:t>
+              <a:t>12/1/2020</a:t>
             </a:fld>
             <a:endParaRPr lang="en-US" altLang="en-US"/>
           </a:p>
@@ -1282,7 +1282,7 @@
               <a:pPr>
                 <a:defRPr/>
               </a:pPr>
-              <a:t>11/30/2020</a:t>
+              <a:t>12/1/2020</a:t>
             </a:fld>
             <a:endParaRPr lang="en-US" altLang="en-US"/>
           </a:p>
@@ -1484,7 +1484,7 @@
               <a:pPr>
                 <a:defRPr/>
               </a:pPr>
-              <a:t>11/30/2020</a:t>
+              <a:t>12/1/2020</a:t>
             </a:fld>
             <a:endParaRPr lang="en-US" altLang="en-US"/>
           </a:p>
@@ -1709,7 +1709,7 @@
               <a:pPr>
                 <a:defRPr/>
               </a:pPr>
-              <a:t>11/30/2020</a:t>
+              <a:t>12/1/2020</a:t>
             </a:fld>
             <a:endParaRPr lang="en-US" altLang="en-US"/>
           </a:p>
@@ -2028,7 +2028,7 @@
               <a:pPr>
                 <a:defRPr/>
               </a:pPr>
-              <a:t>11/30/2020</a:t>
+              <a:t>12/1/2020</a:t>
             </a:fld>
             <a:endParaRPr lang="en-US" altLang="en-US"/>
           </a:p>
@@ -2486,7 +2486,7 @@
               <a:pPr>
                 <a:defRPr/>
               </a:pPr>
-              <a:t>11/30/2020</a:t>
+              <a:t>12/1/2020</a:t>
             </a:fld>
             <a:endParaRPr lang="en-US" altLang="en-US"/>
           </a:p>
@@ -2637,7 +2637,7 @@
               <a:pPr>
                 <a:defRPr/>
               </a:pPr>
-              <a:t>11/30/2020</a:t>
+              <a:t>12/1/2020</a:t>
             </a:fld>
             <a:endParaRPr lang="en-US" altLang="en-US"/>
           </a:p>
@@ -2766,7 +2766,7 @@
               <a:pPr>
                 <a:defRPr/>
               </a:pPr>
-              <a:t>11/30/2020</a:t>
+              <a:t>12/1/2020</a:t>
             </a:fld>
             <a:endParaRPr lang="en-US" altLang="en-US"/>
           </a:p>
@@ -3075,7 +3075,7 @@
               <a:pPr>
                 <a:defRPr/>
               </a:pPr>
-              <a:t>11/30/2020</a:t>
+              <a:t>12/1/2020</a:t>
             </a:fld>
             <a:endParaRPr lang="en-US" altLang="en-US"/>
           </a:p>
@@ -3362,7 +3362,7 @@
               <a:pPr>
                 <a:defRPr/>
               </a:pPr>
-              <a:t>11/30/2020</a:t>
+              <a:t>12/1/2020</a:t>
             </a:fld>
             <a:endParaRPr lang="en-US" altLang="en-US"/>
           </a:p>
@@ -3685,7 +3685,7 @@
               <a:pPr>
                 <a:defRPr/>
               </a:pPr>
-              <a:t>11/30/2020</a:t>
+              <a:t>12/1/2020</a:t>
             </a:fld>
             <a:endParaRPr lang="en-US" altLang="en-US"/>
           </a:p>
@@ -8111,14 +8111,14 @@
           <p:nvPr>
             <p:extLst>
               <p:ext uri="{D42A27DB-BD31-4B8C-83A1-F6EECF244321}">
-                <p14:modId xmlns:p14="http://schemas.microsoft.com/office/powerpoint/2010/main" val="2564408296"/>
+                <p14:modId xmlns:p14="http://schemas.microsoft.com/office/powerpoint/2010/main" val="2646555452"/>
               </p:ext>
             </p:extLst>
           </p:nvPr>
         </p:nvGraphicFramePr>
         <p:xfrm>
-          <a:off x="145432" y="1844040"/>
-          <a:ext cx="8853135" cy="2956560"/>
+          <a:off x="145433" y="1844040"/>
+          <a:ext cx="8820768" cy="2956560"/>
         </p:xfrm>
         <a:graphic>
           <a:graphicData uri="http://schemas.openxmlformats.org/drawingml/2006/table">
@@ -8127,70 +8127,70 @@
                 <a:tableStyleId>{21E4AEA4-8DFA-4A89-87EB-49C32662AFE0}</a:tableStyleId>
               </a:tblPr>
               <a:tblGrid>
-                <a:gridCol w="271060">
+                <a:gridCol w="266276">
                   <a:extLst>
                     <a:ext uri="{9D8B030D-6E8A-4147-A177-3AD203B41FA5}">
                       <a16:colId xmlns:a16="http://schemas.microsoft.com/office/drawing/2014/main" val="3967516979"/>
                     </a:ext>
                   </a:extLst>
                 </a:gridCol>
-                <a:gridCol w="2757758">
+                <a:gridCol w="2709085">
                   <a:extLst>
                     <a:ext uri="{9D8B030D-6E8A-4147-A177-3AD203B41FA5}">
                       <a16:colId xmlns:a16="http://schemas.microsoft.com/office/drawing/2014/main" val="1422853911"/>
                     </a:ext>
                   </a:extLst>
                 </a:gridCol>
-                <a:gridCol w="809943">
+                <a:gridCol w="795648">
                   <a:extLst>
                     <a:ext uri="{9D8B030D-6E8A-4147-A177-3AD203B41FA5}">
                       <a16:colId xmlns:a16="http://schemas.microsoft.com/office/drawing/2014/main" val="1161098326"/>
                     </a:ext>
                   </a:extLst>
                 </a:gridCol>
-                <a:gridCol w="809943">
+                <a:gridCol w="795648">
                   <a:extLst>
                     <a:ext uri="{9D8B030D-6E8A-4147-A177-3AD203B41FA5}">
                       <a16:colId xmlns:a16="http://schemas.microsoft.com/office/drawing/2014/main" val="2529217557"/>
                     </a:ext>
                   </a:extLst>
                 </a:gridCol>
-                <a:gridCol w="593343">
+                <a:gridCol w="582871">
                   <a:extLst>
                     <a:ext uri="{9D8B030D-6E8A-4147-A177-3AD203B41FA5}">
                       <a16:colId xmlns:a16="http://schemas.microsoft.com/office/drawing/2014/main" val="3619058524"/>
                     </a:ext>
                   </a:extLst>
                 </a:gridCol>
-                <a:gridCol w="593343">
+                <a:gridCol w="706757">
                   <a:extLst>
                     <a:ext uri="{9D8B030D-6E8A-4147-A177-3AD203B41FA5}">
                       <a16:colId xmlns:a16="http://schemas.microsoft.com/office/drawing/2014/main" val="2732994307"/>
                     </a:ext>
                   </a:extLst>
                 </a:gridCol>
-                <a:gridCol w="719455">
+                <a:gridCol w="706757">
                   <a:extLst>
                     <a:ext uri="{9D8B030D-6E8A-4147-A177-3AD203B41FA5}">
                       <a16:colId xmlns:a16="http://schemas.microsoft.com/office/drawing/2014/main" val="3963453409"/>
                     </a:ext>
                   </a:extLst>
                 </a:gridCol>
-                <a:gridCol w="628968">
+                <a:gridCol w="617867">
                   <a:extLst>
                     <a:ext uri="{9D8B030D-6E8A-4147-A177-3AD203B41FA5}">
                       <a16:colId xmlns:a16="http://schemas.microsoft.com/office/drawing/2014/main" val="390445421"/>
                     </a:ext>
                   </a:extLst>
                 </a:gridCol>
-                <a:gridCol w="809943">
+                <a:gridCol w="795648">
                   <a:extLst>
                     <a:ext uri="{9D8B030D-6E8A-4147-A177-3AD203B41FA5}">
                       <a16:colId xmlns:a16="http://schemas.microsoft.com/office/drawing/2014/main" val="2253124922"/>
                     </a:ext>
                   </a:extLst>
                 </a:gridCol>
-                <a:gridCol w="859379">
+                <a:gridCol w="844211">
                   <a:extLst>
                     <a:ext uri="{9D8B030D-6E8A-4147-A177-3AD203B41FA5}">
                       <a16:colId xmlns:a16="http://schemas.microsoft.com/office/drawing/2014/main" val="2741287"/>
@@ -8419,7 +8419,7 @@
                     <a:p>
                       <a:r>
                         <a:rPr lang="en-US" sz="1400" dirty="0"/>
-                        <a:t>63.13</a:t>
+                        <a:t>104.81</a:t>
                       </a:r>
                     </a:p>
                   </a:txBody>
@@ -8458,7 +8458,7 @@
                     <a:p>
                       <a:r>
                         <a:rPr lang="en-US" sz="1400" dirty="0"/>
-                        <a:t>407.88</a:t>
+                        <a:t>806.31</a:t>
                       </a:r>
                     </a:p>
                   </a:txBody>
@@ -8578,7 +8578,7 @@
                     <a:p>
                       <a:r>
                         <a:rPr lang="en-US" sz="1400" dirty="0"/>
-                        <a:t>44.67</a:t>
+                        <a:t>75.19</a:t>
                       </a:r>
                     </a:p>
                   </a:txBody>
@@ -8617,7 +8617,7 @@
                     <a:p>
                       <a:r>
                         <a:rPr lang="en-US" sz="1400" dirty="0"/>
-                        <a:t>807.33</a:t>
+                        <a:t>1600.63</a:t>
                       </a:r>
                     </a:p>
                   </a:txBody>
@@ -8736,7 +8736,7 @@
                     <a:p>
                       <a:r>
                         <a:rPr lang="en-US" sz="1400" dirty="0"/>
-                        <a:t>55.26</a:t>
+                        <a:t>86.09</a:t>
                       </a:r>
                     </a:p>
                   </a:txBody>
@@ -8775,7 +8775,7 @@
                     <a:p>
                       <a:r>
                         <a:rPr lang="en-US" sz="1400" dirty="0"/>
-                        <a:t>95.91</a:t>
+                        <a:t>316.81</a:t>
                       </a:r>
                     </a:p>
                   </a:txBody>
@@ -8963,7 +8963,7 @@
                       </a:pPr>
                       <a:r>
                         <a:rPr lang="en-US" sz="1400" dirty="0"/>
-                        <a:t>52.39</a:t>
+                        <a:t>70.40</a:t>
                       </a:r>
                     </a:p>
                   </a:txBody>
@@ -9053,7 +9053,7 @@
                       </a:pPr>
                       <a:r>
                         <a:rPr lang="en-US" sz="1400" dirty="0"/>
-                        <a:t>105.84</a:t>
+                        <a:t>1106.07</a:t>
                       </a:r>
                     </a:p>
                   </a:txBody>
@@ -9173,7 +9173,7 @@
                     <a:p>
                       <a:r>
                         <a:rPr lang="en-US" sz="1400" dirty="0"/>
-                        <a:t>79.02</a:t>
+                        <a:t>69.24</a:t>
                       </a:r>
                     </a:p>
                   </a:txBody>
@@ -9246,7 +9246,7 @@
                     <a:p>
                       <a:r>
                         <a:rPr lang="en-US" sz="1400" dirty="0"/>
-                        <a:t>160.38</a:t>
+                        <a:t>462.13</a:t>
                       </a:r>
                     </a:p>
                   </a:txBody>
@@ -9366,7 +9366,7 @@
                     <a:p>
                       <a:r>
                         <a:rPr lang="en-US" sz="1400" dirty="0"/>
-                        <a:t>76.48</a:t>
+                        <a:t>63.13</a:t>
                       </a:r>
                     </a:p>
                   </a:txBody>
@@ -9405,7 +9405,7 @@
                     <a:p>
                       <a:r>
                         <a:rPr lang="en-US" sz="1400" dirty="0"/>
-                        <a:t>232.29</a:t>
+                        <a:t>2665.13</a:t>
                       </a:r>
                     </a:p>
                   </a:txBody>
@@ -9525,7 +9525,7 @@
                     <a:p>
                       <a:r>
                         <a:rPr lang="en-US" sz="1400" dirty="0"/>
-                        <a:t>39.17</a:t>
+                        <a:t>36.66</a:t>
                       </a:r>
                     </a:p>
                   </a:txBody>
@@ -9564,7 +9564,7 @@
                     <a:p>
                       <a:r>
                         <a:rPr lang="en-US" sz="1400" dirty="0"/>
-                        <a:t>200.57</a:t>
+                        <a:t>2050.89</a:t>
                       </a:r>
                     </a:p>
                   </a:txBody>
@@ -9667,7 +9667,7 @@
                     <a:p>
                       <a:r>
                         <a:rPr lang="en-US" sz="1400" dirty="0"/>
-                        <a:t>50.63</a:t>
+                        <a:t>25.67</a:t>
                       </a:r>
                     </a:p>
                   </a:txBody>
@@ -9706,7 +9706,7 @@
                     <a:p>
                       <a:r>
                         <a:rPr lang="en-US" sz="1400" dirty="0"/>
-                        <a:t>1052.71</a:t>
+                        <a:t>497.34</a:t>
                       </a:r>
                     </a:p>
                   </a:txBody>
@@ -10191,7 +10191,7 @@
           <p:nvPr>
             <p:extLst>
               <p:ext uri="{D42A27DB-BD31-4B8C-83A1-F6EECF244321}">
-                <p14:modId xmlns:p14="http://schemas.microsoft.com/office/powerpoint/2010/main" val="744306679"/>
+                <p14:modId xmlns:p14="http://schemas.microsoft.com/office/powerpoint/2010/main" val="4094796561"/>
               </p:ext>
             </p:extLst>
           </p:nvPr>
@@ -10538,7 +10538,7 @@
                     <a:p>
                       <a:r>
                         <a:rPr lang="en-US" sz="1400" b="1" dirty="0"/>
-                        <a:t>99.18</a:t>
+                        <a:t>99.21</a:t>
                       </a:r>
                     </a:p>
                   </a:txBody>
@@ -10658,7 +10658,7 @@
                     <a:p>
                       <a:r>
                         <a:rPr lang="en-US" sz="1400" dirty="0"/>
-                        <a:t>96.39</a:t>
+                        <a:t>96.92</a:t>
                       </a:r>
                     </a:p>
                   </a:txBody>
@@ -10697,7 +10697,7 @@
                     <a:p>
                       <a:r>
                         <a:rPr lang="en-US" sz="1400" b="1" dirty="0"/>
-                        <a:t>96.74</a:t>
+                        <a:t>97.11</a:t>
                       </a:r>
                     </a:p>
                   </a:txBody>
@@ -10855,7 +10855,7 @@
                     <a:p>
                       <a:r>
                         <a:rPr lang="en-US" sz="1400" dirty="0"/>
-                        <a:t>50.00</a:t>
+                        <a:t>99.23</a:t>
                       </a:r>
                     </a:p>
                   </a:txBody>
@@ -11133,7 +11133,7 @@
                       </a:pPr>
                       <a:r>
                         <a:rPr lang="en-US" sz="1400" dirty="0"/>
-                        <a:t>57.05</a:t>
+                        <a:t>59.99</a:t>
                       </a:r>
                     </a:p>
                   </a:txBody>
@@ -11292,7 +11292,7 @@
                     <a:p>
                       <a:r>
                         <a:rPr lang="en-US" sz="1400" dirty="0"/>
-                        <a:t>50.25</a:t>
+                        <a:t>54.28</a:t>
                       </a:r>
                     </a:p>
                   </a:txBody>
@@ -11451,7 +11451,7 @@
                     <a:p>
                       <a:r>
                         <a:rPr lang="en-US" sz="1400" dirty="0"/>
-                        <a:t>58.23</a:t>
+                        <a:t>71.31</a:t>
                       </a:r>
                     </a:p>
                   </a:txBody>
@@ -11610,7 +11610,7 @@
                     <a:p>
                       <a:r>
                         <a:rPr lang="en-US" sz="1400" dirty="0"/>
-                        <a:t>62.11</a:t>
+                        <a:t>87.32</a:t>
                       </a:r>
                     </a:p>
                   </a:txBody>

</xml_diff>

<commit_message>
Presentation update from Manjot data
</commit_message>
<xml_diff>
--- a/proposal/project.pptx
+++ b/proposal/project.pptx
@@ -7023,7 +7023,7 @@
           <p:nvPr>
             <p:extLst>
               <p:ext uri="{D42A27DB-BD31-4B8C-83A1-F6EECF244321}">
-                <p14:modId xmlns:p14="http://schemas.microsoft.com/office/powerpoint/2010/main" val="1533789280"/>
+                <p14:modId xmlns:p14="http://schemas.microsoft.com/office/powerpoint/2010/main" val="1720115997"/>
               </p:ext>
             </p:extLst>
           </p:nvPr>
@@ -7625,7 +7625,7 @@
                           <a:ea typeface="+mn-ea"/>
                           <a:cs typeface="+mn-cs"/>
                         </a:rPr>
-                        <a:t>Gaussian naive Bayes</a:t>
+                        <a:t>Gaussian Naïve Bayes</a:t>
                       </a:r>
                     </a:p>
                   </a:txBody>
@@ -8111,7 +8111,7 @@
           <p:nvPr>
             <p:extLst>
               <p:ext uri="{D42A27DB-BD31-4B8C-83A1-F6EECF244321}">
-                <p14:modId xmlns:p14="http://schemas.microsoft.com/office/powerpoint/2010/main" val="2646555452"/>
+                <p14:modId xmlns:p14="http://schemas.microsoft.com/office/powerpoint/2010/main" val="2338829349"/>
               </p:ext>
             </p:extLst>
           </p:nvPr>
@@ -8393,7 +8393,7 @@
                     <a:p>
                       <a:r>
                         <a:rPr lang="en-US" sz="1400" dirty="0"/>
-                        <a:t>0.48</a:t>
+                        <a:t>0.51</a:t>
                       </a:r>
                     </a:p>
                   </a:txBody>
@@ -8552,7 +8552,7 @@
                     <a:p>
                       <a:r>
                         <a:rPr lang="en-US" sz="1400" dirty="0"/>
-                        <a:t>1025.06</a:t>
+                        <a:t>542.42</a:t>
                       </a:r>
                     </a:p>
                   </a:txBody>
@@ -8710,7 +8710,7 @@
                     <a:p>
                       <a:r>
                         <a:rPr lang="en-US" sz="1400" dirty="0"/>
-                        <a:t>3034.56</a:t>
+                        <a:t>3216.47</a:t>
                       </a:r>
                     </a:p>
                   </a:txBody>
@@ -8788,7 +8788,7 @@
                     <a:p>
                       <a:r>
                         <a:rPr lang="en-US" sz="1400" dirty="0"/>
-                        <a:t>0.04</a:t>
+                        <a:t>0.05</a:t>
                       </a:r>
                     </a:p>
                   </a:txBody>
@@ -8903,7 +8903,7 @@
                       </a:pPr>
                       <a:r>
                         <a:rPr lang="en-US" sz="1400" dirty="0"/>
-                        <a:t>314.36</a:t>
+                        <a:t>190.30</a:t>
                       </a:r>
                     </a:p>
                   </a:txBody>
@@ -9083,7 +9083,7 @@
                       </a:pPr>
                       <a:r>
                         <a:rPr lang="en-US" sz="1400" dirty="0"/>
-                        <a:t>0.04</a:t>
+                        <a:t>0.03</a:t>
                       </a:r>
                     </a:p>
                   </a:txBody>
@@ -9147,7 +9147,7 @@
                     <a:p>
                       <a:r>
                         <a:rPr lang="en-US" sz="1400" dirty="0"/>
-                        <a:t>157.25</a:t>
+                        <a:t>219.35</a:t>
                       </a:r>
                     </a:p>
                   </a:txBody>
@@ -9259,7 +9259,7 @@
                     <a:p>
                       <a:r>
                         <a:rPr lang="en-US" sz="1400" dirty="0"/>
-                        <a:t>0.01</a:t>
+                        <a:t>0.02</a:t>
                       </a:r>
                     </a:p>
                   </a:txBody>
@@ -9340,7 +9340,7 @@
                     <a:p>
                       <a:r>
                         <a:rPr lang="en-US" sz="1400" dirty="0"/>
-                        <a:t>138.93</a:t>
+                        <a:t>183.77</a:t>
                       </a:r>
                     </a:p>
                   </a:txBody>
@@ -9499,7 +9499,7 @@
                     <a:p>
                       <a:r>
                         <a:rPr lang="en-US" sz="1400" dirty="0"/>
-                        <a:t>70.85</a:t>
+                        <a:t>96.08</a:t>
                       </a:r>
                     </a:p>
                   </a:txBody>
@@ -9577,7 +9577,7 @@
                     <a:p>
                       <a:r>
                         <a:rPr lang="en-US" sz="1400" dirty="0"/>
-                        <a:t>0.02</a:t>
+                        <a:t>0.01</a:t>
                       </a:r>
                     </a:p>
                   </a:txBody>
@@ -9641,7 +9641,7 @@
                     <a:p>
                       <a:r>
                         <a:rPr lang="en-US" sz="1400" dirty="0"/>
-                        <a:t>0.40</a:t>
+                        <a:t>0.24</a:t>
                       </a:r>
                     </a:p>
                   </a:txBody>
@@ -9719,7 +9719,7 @@
                     <a:p>
                       <a:r>
                         <a:rPr lang="en-US" sz="1400" dirty="0"/>
-                        <a:t>0.03</a:t>
+                        <a:t>0.01</a:t>
                       </a:r>
                     </a:p>
                   </a:txBody>
@@ -10191,7 +10191,7 @@
           <p:nvPr>
             <p:extLst>
               <p:ext uri="{D42A27DB-BD31-4B8C-83A1-F6EECF244321}">
-                <p14:modId xmlns:p14="http://schemas.microsoft.com/office/powerpoint/2010/main" val="4094796561"/>
+                <p14:modId xmlns:p14="http://schemas.microsoft.com/office/powerpoint/2010/main" val="201760115"/>
               </p:ext>
             </p:extLst>
           </p:nvPr>
@@ -10632,7 +10632,7 @@
                     <a:p>
                       <a:r>
                         <a:rPr lang="en-US" sz="1400" dirty="0"/>
-                        <a:t>50.00</a:t>
+                        <a:t>98.19</a:t>
                       </a:r>
                     </a:p>
                   </a:txBody>
@@ -10696,21 +10696,21 @@
                     <a:lstStyle/>
                     <a:p>
                       <a:r>
+                        <a:rPr lang="en-US" sz="1400" b="0" dirty="0"/>
+                        <a:t>97.11</a:t>
+                      </a:r>
+                    </a:p>
+                  </a:txBody>
+                  <a:tcPr/>
+                </a:tc>
+                <a:tc>
+                  <a:txBody>
+                    <a:bodyPr/>
+                    <a:lstStyle/>
+                    <a:p>
+                      <a:r>
                         <a:rPr lang="en-US" sz="1400" b="1" dirty="0"/>
-                        <a:t>97.11</a:t>
-                      </a:r>
-                    </a:p>
-                  </a:txBody>
-                  <a:tcPr/>
-                </a:tc>
-                <a:tc>
-                  <a:txBody>
-                    <a:bodyPr/>
-                    <a:lstStyle/>
-                    <a:p>
-                      <a:r>
-                        <a:rPr lang="en-US" sz="1400" dirty="0"/>
-                        <a:t>95.28</a:t>
+                        <a:t>99.36</a:t>
                       </a:r>
                     </a:p>
                   </a:txBody>
@@ -10790,7 +10790,7 @@
                     <a:p>
                       <a:r>
                         <a:rPr lang="en-US" sz="1400" dirty="0"/>
-                        <a:t>81.66</a:t>
+                        <a:t>81.21</a:t>
                       </a:r>
                     </a:p>
                   </a:txBody>
@@ -10868,7 +10868,7 @@
                     <a:p>
                       <a:r>
                         <a:rPr lang="en-US" sz="1400" dirty="0"/>
-                        <a:t>70.82</a:t>
+                        <a:t>71.08</a:t>
                       </a:r>
                     </a:p>
                   </a:txBody>
@@ -11227,7 +11227,7 @@
                     <a:p>
                       <a:r>
                         <a:rPr lang="en-US" sz="1400" dirty="0"/>
-                        <a:t>50.09</a:t>
+                        <a:t>47.34</a:t>
                       </a:r>
                     </a:p>
                   </a:txBody>
@@ -11305,7 +11305,7 @@
                     <a:p>
                       <a:r>
                         <a:rPr lang="en-US" sz="1400" dirty="0"/>
-                        <a:t>50.11</a:t>
+                        <a:t>52.98</a:t>
                       </a:r>
                     </a:p>
                   </a:txBody>
@@ -11386,7 +11386,7 @@
                     <a:p>
                       <a:r>
                         <a:rPr lang="en-US" sz="1400" dirty="0"/>
-                        <a:t>54.83</a:t>
+                        <a:t>54.69</a:t>
                       </a:r>
                     </a:p>
                   </a:txBody>
@@ -11464,7 +11464,7 @@
                     <a:p>
                       <a:r>
                         <a:rPr lang="en-US" sz="1400" dirty="0"/>
-                        <a:t>67.43</a:t>
+                        <a:t>68.37</a:t>
                       </a:r>
                     </a:p>
                   </a:txBody>
@@ -11545,7 +11545,7 @@
                     <a:p>
                       <a:r>
                         <a:rPr lang="en-US" sz="1400" dirty="0"/>
-                        <a:t>61.53</a:t>
+                        <a:t>62.10</a:t>
                       </a:r>
                     </a:p>
                   </a:txBody>
@@ -11623,7 +11623,7 @@
                     <a:p>
                       <a:r>
                         <a:rPr lang="en-US" sz="1400" dirty="0"/>
-                        <a:t>82.18</a:t>
+                        <a:t>81.50</a:t>
                       </a:r>
                     </a:p>
                   </a:txBody>
@@ -11687,7 +11687,7 @@
                     <a:p>
                       <a:r>
                         <a:rPr lang="en-US" sz="1400" dirty="0"/>
-                        <a:t>84.26</a:t>
+                        <a:t>84.73</a:t>
                       </a:r>
                     </a:p>
                   </a:txBody>
@@ -11765,7 +11765,7 @@
                     <a:p>
                       <a:r>
                         <a:rPr lang="en-US" sz="1400" dirty="0"/>
-                        <a:t>57.92</a:t>
+                        <a:t>72.69</a:t>
                       </a:r>
                     </a:p>
                   </a:txBody>
@@ -12237,14 +12237,14 @@
           <p:nvPr>
             <p:extLst>
               <p:ext uri="{D42A27DB-BD31-4B8C-83A1-F6EECF244321}">
-                <p14:modId xmlns:p14="http://schemas.microsoft.com/office/powerpoint/2010/main" val="3464876205"/>
+                <p14:modId xmlns:p14="http://schemas.microsoft.com/office/powerpoint/2010/main" val="1751174045"/>
               </p:ext>
             </p:extLst>
           </p:nvPr>
         </p:nvGraphicFramePr>
         <p:xfrm>
           <a:off x="380754" y="1691655"/>
-          <a:ext cx="8507904" cy="3474689"/>
+          <a:ext cx="8507904" cy="3457946"/>
         </p:xfrm>
         <a:graphic>
           <a:graphicData uri="http://schemas.openxmlformats.org/drawingml/2006/table">
@@ -12454,40 +12454,8 @@
                     <a:lstStyle/>
                     <a:p>
                       <a:r>
-                        <a:rPr lang="en-US" sz="1400" b="1" dirty="0">
-                          <a:effectLst/>
-                          <a:ea typeface="Calibri" panose="020F0502020204030204" pitchFamily="34" charset="0"/>
-                          <a:cs typeface="Times New Roman" panose="02020603050405020304" pitchFamily="18" charset="0"/>
-                        </a:rPr>
-                        <a:t>Neural network </a:t>
-                      </a:r>
-                      <a:r>
-                        <a:rPr lang="en-US" sz="1400" dirty="0"/>
-                        <a:t>(activation='logistic', </a:t>
-                      </a:r>
-                      <a:r>
-                        <a:rPr lang="en-US" sz="1400" dirty="0" err="1"/>
-                        <a:t>batch_size</a:t>
-                      </a:r>
-                      <a:r>
-                        <a:rPr lang="en-US" sz="1400" dirty="0"/>
-                        <a:t>=40, </a:t>
-                      </a:r>
-                      <a:r>
-                        <a:rPr lang="en-US" sz="1400" dirty="0" err="1"/>
-                        <a:t>max_iter</a:t>
-                      </a:r>
-                      <a:r>
-                        <a:rPr lang="en-US" sz="1400" dirty="0"/>
-                        <a:t>=500, momentum=0.0001, </a:t>
-                      </a:r>
-                      <a:r>
-                        <a:rPr lang="en-US" sz="1400" dirty="0" err="1"/>
-                        <a:t>random_state</a:t>
-                      </a:r>
-                      <a:r>
-                        <a:rPr lang="en-US" sz="1400" dirty="0"/>
-                        <a:t>=0)</a:t>
+                        <a:rPr lang="en-US" sz="1400" b="1" dirty="0"/>
+                        <a:t>Gaussian Naïve Bayes</a:t>
                       </a:r>
                     </a:p>
                   </a:txBody>

</xml_diff>